<commit_message>
added empty components, design
</commit_message>
<xml_diff>
--- a/administrative/design.pptx
+++ b/administrative/design.pptx
@@ -4306,10 +4306,10 @@
       </p:grpSpPr>
       <p:sp>
         <p:nvSpPr>
-          <p:cNvPr id="19" name="Rectangle 18">
-            <a:extLst>
-              <a:ext uri="{FF2B5EF4-FFF2-40B4-BE49-F238E27FC236}">
-                <a16:creationId xmlns:a16="http://schemas.microsoft.com/office/drawing/2014/main" id="{0FD743AF-0AB5-EF7F-9CF5-514B7BD7190D}"/>
+          <p:cNvPr id="7" name="Rectangle 6">
+            <a:extLst>
+              <a:ext uri="{FF2B5EF4-FFF2-40B4-BE49-F238E27FC236}">
+                <a16:creationId xmlns:a16="http://schemas.microsoft.com/office/drawing/2014/main" id="{394C56B1-37CE-8A95-2B98-1CAF48B9F8FF}"/>
               </a:ext>
             </a:extLst>
           </p:cNvPr>
@@ -4318,8 +4318,8 @@
         </p:nvSpPr>
         <p:spPr>
           <a:xfrm>
-            <a:off x="2143328" y="2894134"/>
-            <a:ext cx="6319737" cy="340313"/>
+            <a:off x="3625175" y="2894134"/>
+            <a:ext cx="4840861" cy="340313"/>
           </a:xfrm>
           <a:prstGeom prst="rect">
             <a:avLst/>
@@ -4344,10 +4344,8 @@
           <a:lstStyle/>
           <a:p>
             <a:r>
-              <a:rPr lang="en-US" dirty="0">
-                <a:hlinkClick r:id="rId3"/>
-              </a:rPr>
-              <a:t>http://abc.sh/rick</a:t>
+              <a:rPr lang="en-US" dirty="0"/>
+              <a:t>www.youtube.com/watch?eawsfgw1214123121...</a:t>
             </a:r>
             <a:endParaRPr lang="en-IL" dirty="0"/>
           </a:p>
@@ -4355,10 +4353,10 @@
       </p:sp>
       <p:sp>
         <p:nvSpPr>
-          <p:cNvPr id="20" name="Rectangle 19">
-            <a:extLst>
-              <a:ext uri="{FF2B5EF4-FFF2-40B4-BE49-F238E27FC236}">
-                <a16:creationId xmlns:a16="http://schemas.microsoft.com/office/drawing/2014/main" id="{44F03E5D-D6D4-95EC-C336-8B612F8548EE}"/>
+          <p:cNvPr id="8" name="Rectangle 7">
+            <a:extLst>
+              <a:ext uri="{FF2B5EF4-FFF2-40B4-BE49-F238E27FC236}">
+                <a16:creationId xmlns:a16="http://schemas.microsoft.com/office/drawing/2014/main" id="{5D343E6F-2A0E-C8D4-5875-A9F9205C2433}"/>
               </a:ext>
             </a:extLst>
           </p:cNvPr>
@@ -4367,8 +4365,8 @@
         </p:nvSpPr>
         <p:spPr>
           <a:xfrm>
-            <a:off x="2143327" y="3385207"/>
-            <a:ext cx="6319737" cy="340313"/>
+            <a:off x="3625174" y="3385207"/>
+            <a:ext cx="4840861" cy="340313"/>
           </a:xfrm>
           <a:prstGeom prst="rect">
             <a:avLst/>
@@ -4393,14 +4391,8 @@
           <a:lstStyle/>
           <a:p>
             <a:r>
-              <a:rPr lang="en-US" dirty="0">
-                <a:hlinkClick r:id="rId4"/>
-              </a:rPr>
-              <a:t>http://abc.sh/test</a:t>
-            </a:r>
-            <a:r>
               <a:rPr lang="en-US" dirty="0"/>
-              <a:t> </a:t>
+              <a:t>www.youtube.com/watch?eawsfgw1214123121...</a:t>
             </a:r>
             <a:endParaRPr lang="en-IL" dirty="0"/>
           </a:p>
@@ -4408,10 +4400,10 @@
       </p:sp>
       <p:sp>
         <p:nvSpPr>
-          <p:cNvPr id="21" name="Rectangle 20">
-            <a:extLst>
-              <a:ext uri="{FF2B5EF4-FFF2-40B4-BE49-F238E27FC236}">
-                <a16:creationId xmlns:a16="http://schemas.microsoft.com/office/drawing/2014/main" id="{1AFBC962-FF90-9EDC-4B30-927B76DEF744}"/>
+          <p:cNvPr id="9" name="Rectangle 8">
+            <a:extLst>
+              <a:ext uri="{FF2B5EF4-FFF2-40B4-BE49-F238E27FC236}">
+                <a16:creationId xmlns:a16="http://schemas.microsoft.com/office/drawing/2014/main" id="{2B0FB064-8AAA-8D91-6F5B-E3154C86A9DC}"/>
               </a:ext>
             </a:extLst>
           </p:cNvPr>
@@ -4420,8 +4412,8 @@
         </p:nvSpPr>
         <p:spPr>
           <a:xfrm>
-            <a:off x="2143327" y="3879703"/>
-            <a:ext cx="6319737" cy="340313"/>
+            <a:off x="3625174" y="3879703"/>
+            <a:ext cx="4840861" cy="340313"/>
           </a:xfrm>
           <a:prstGeom prst="rect">
             <a:avLst/>
@@ -4446,414 +4438,19 @@
           <a:lstStyle/>
           <a:p>
             <a:r>
-              <a:rPr lang="en-US" dirty="0">
-                <a:hlinkClick r:id="rId5"/>
-              </a:rPr>
-              <a:t>http://abc.sh/jojo_part7</a:t>
-            </a:r>
-            <a:r>
               <a:rPr lang="en-US" dirty="0"/>
-              <a:t> </a:t>
-            </a:r>
-          </a:p>
-        </p:txBody>
-      </p:sp>
-      <p:sp>
-        <p:nvSpPr>
-          <p:cNvPr id="22" name="TextBox 21">
-            <a:extLst>
-              <a:ext uri="{FF2B5EF4-FFF2-40B4-BE49-F238E27FC236}">
-                <a16:creationId xmlns:a16="http://schemas.microsoft.com/office/drawing/2014/main" id="{69BDDB1A-D1A6-BD20-61C4-A778136C59B4}"/>
-              </a:ext>
-            </a:extLst>
-          </p:cNvPr>
-          <p:cNvSpPr txBox="1"/>
-          <p:nvPr/>
-        </p:nvSpPr>
-        <p:spPr>
-          <a:xfrm>
-            <a:off x="3573496" y="433379"/>
-            <a:ext cx="4023806" cy="646331"/>
-          </a:xfrm>
-          <a:prstGeom prst="rect">
-            <a:avLst/>
-          </a:prstGeom>
-          <a:noFill/>
-        </p:spPr>
-        <p:txBody>
-          <a:bodyPr wrap="square" rtlCol="0">
-            <a:spAutoFit/>
-          </a:bodyPr>
-          <a:lstStyle/>
-          <a:p>
-            <a:r>
-              <a:rPr lang="en-US" sz="3600" dirty="0"/>
-              <a:t>ABC URL Shortener</a:t>
-            </a:r>
-            <a:endParaRPr lang="en-IL" sz="3600" dirty="0"/>
-          </a:p>
-        </p:txBody>
-      </p:sp>
-      <p:pic>
-        <p:nvPicPr>
-          <p:cNvPr id="24" name="Picture 23" descr="Shape&#10;&#10;Description automatically generated with low confidence">
-            <a:extLst>
-              <a:ext uri="{FF2B5EF4-FFF2-40B4-BE49-F238E27FC236}">
-                <a16:creationId xmlns:a16="http://schemas.microsoft.com/office/drawing/2014/main" id="{15305663-19BC-13DA-6537-F03577ABAA61}"/>
-              </a:ext>
-            </a:extLst>
-          </p:cNvPr>
-          <p:cNvPicPr>
-            <a:picLocks noChangeAspect="1"/>
-          </p:cNvPicPr>
-          <p:nvPr/>
-        </p:nvPicPr>
-        <p:blipFill>
-          <a:blip r:embed="rId6">
-            <a:extLst>
-              <a:ext uri="{28A0092B-C50C-407E-A947-70E740481C1C}">
-                <a14:useLocalDpi xmlns:a14="http://schemas.microsoft.com/office/drawing/2010/main" val="0"/>
-              </a:ext>
-            </a:extLst>
-          </a:blip>
-          <a:stretch>
-            <a:fillRect/>
-          </a:stretch>
-        </p:blipFill>
-        <p:spPr>
-          <a:xfrm>
-            <a:off x="8648195" y="2894133"/>
-            <a:ext cx="340313" cy="340313"/>
-          </a:xfrm>
-          <a:prstGeom prst="rect">
-            <a:avLst/>
-          </a:prstGeom>
-        </p:spPr>
-      </p:pic>
-      <p:pic>
-        <p:nvPicPr>
-          <p:cNvPr id="25" name="Picture 24" descr="Shape&#10;&#10;Description automatically generated with low confidence">
-            <a:extLst>
-              <a:ext uri="{FF2B5EF4-FFF2-40B4-BE49-F238E27FC236}">
-                <a16:creationId xmlns:a16="http://schemas.microsoft.com/office/drawing/2014/main" id="{308891CD-2DC5-5980-9EDE-6FA722D09552}"/>
-              </a:ext>
-            </a:extLst>
-          </p:cNvPr>
-          <p:cNvPicPr>
-            <a:picLocks noChangeAspect="1"/>
-          </p:cNvPicPr>
-          <p:nvPr/>
-        </p:nvPicPr>
-        <p:blipFill>
-          <a:blip r:embed="rId6">
-            <a:extLst>
-              <a:ext uri="{28A0092B-C50C-407E-A947-70E740481C1C}">
-                <a14:useLocalDpi xmlns:a14="http://schemas.microsoft.com/office/drawing/2010/main" val="0"/>
-              </a:ext>
-            </a:extLst>
-          </a:blip>
-          <a:stretch>
-            <a:fillRect/>
-          </a:stretch>
-        </p:blipFill>
-        <p:spPr>
-          <a:xfrm>
-            <a:off x="8648194" y="3385207"/>
-            <a:ext cx="340313" cy="340313"/>
-          </a:xfrm>
-          <a:prstGeom prst="rect">
-            <a:avLst/>
-          </a:prstGeom>
-        </p:spPr>
-      </p:pic>
-      <p:pic>
-        <p:nvPicPr>
-          <p:cNvPr id="26" name="Picture 25" descr="Shape&#10;&#10;Description automatically generated with low confidence">
-            <a:extLst>
-              <a:ext uri="{FF2B5EF4-FFF2-40B4-BE49-F238E27FC236}">
-                <a16:creationId xmlns:a16="http://schemas.microsoft.com/office/drawing/2014/main" id="{D2489CA5-570C-D8BE-DBE1-0DDCFE9365AB}"/>
-              </a:ext>
-            </a:extLst>
-          </p:cNvPr>
-          <p:cNvPicPr>
-            <a:picLocks noChangeAspect="1"/>
-          </p:cNvPicPr>
-          <p:nvPr/>
-        </p:nvPicPr>
-        <p:blipFill>
-          <a:blip r:embed="rId6">
-            <a:extLst>
-              <a:ext uri="{28A0092B-C50C-407E-A947-70E740481C1C}">
-                <a14:useLocalDpi xmlns:a14="http://schemas.microsoft.com/office/drawing/2010/main" val="0"/>
-              </a:ext>
-            </a:extLst>
-          </a:blip>
-          <a:stretch>
-            <a:fillRect/>
-          </a:stretch>
-        </p:blipFill>
-        <p:spPr>
-          <a:xfrm>
-            <a:off x="8667799" y="3879703"/>
-            <a:ext cx="340313" cy="340313"/>
-          </a:xfrm>
-          <a:prstGeom prst="rect">
-            <a:avLst/>
-          </a:prstGeom>
-        </p:spPr>
-      </p:pic>
-      <p:pic>
-        <p:nvPicPr>
-          <p:cNvPr id="28" name="Picture 27">
-            <a:extLst>
-              <a:ext uri="{FF2B5EF4-FFF2-40B4-BE49-F238E27FC236}">
-                <a16:creationId xmlns:a16="http://schemas.microsoft.com/office/drawing/2014/main" id="{BD242845-0391-ADDE-8F32-D47D55803CFB}"/>
-              </a:ext>
-            </a:extLst>
-          </p:cNvPr>
-          <p:cNvPicPr>
-            <a:picLocks noChangeAspect="1"/>
-          </p:cNvPicPr>
-          <p:nvPr/>
-        </p:nvPicPr>
-        <p:blipFill>
-          <a:blip r:embed="rId7"/>
-          <a:stretch>
-            <a:fillRect/>
-          </a:stretch>
-        </p:blipFill>
-        <p:spPr>
-          <a:xfrm>
-            <a:off x="8750009" y="5400131"/>
-            <a:ext cx="476996" cy="476996"/>
-          </a:xfrm>
-          <a:prstGeom prst="rect">
-            <a:avLst/>
-          </a:prstGeom>
-        </p:spPr>
-      </p:pic>
-      <p:pic>
-        <p:nvPicPr>
-          <p:cNvPr id="45" name="Picture 44" descr="Shape&#10;&#10;Description automatically generated with low confidence">
-            <a:extLst>
-              <a:ext uri="{FF2B5EF4-FFF2-40B4-BE49-F238E27FC236}">
-                <a16:creationId xmlns:a16="http://schemas.microsoft.com/office/drawing/2014/main" id="{096DC805-0C52-660A-096B-E4F18B9530C6}"/>
-              </a:ext>
-            </a:extLst>
-          </p:cNvPr>
-          <p:cNvPicPr>
-            <a:picLocks noChangeAspect="1"/>
-          </p:cNvPicPr>
-          <p:nvPr/>
-        </p:nvPicPr>
-        <p:blipFill>
-          <a:blip r:embed="rId8">
-            <a:extLst>
-              <a:ext uri="{28A0092B-C50C-407E-A947-70E740481C1C}">
-                <a14:useLocalDpi xmlns:a14="http://schemas.microsoft.com/office/drawing/2010/main" val="0"/>
-              </a:ext>
-            </a:extLst>
-          </a:blip>
-          <a:stretch>
-            <a:fillRect/>
-          </a:stretch>
-        </p:blipFill>
-        <p:spPr>
-          <a:xfrm>
-            <a:off x="9056848" y="2866663"/>
-            <a:ext cx="395252" cy="395252"/>
-          </a:xfrm>
-          <a:prstGeom prst="rect">
-            <a:avLst/>
-          </a:prstGeom>
-        </p:spPr>
-      </p:pic>
-      <p:pic>
-        <p:nvPicPr>
-          <p:cNvPr id="46" name="Picture 45" descr="Shape&#10;&#10;Description automatically generated with low confidence">
-            <a:extLst>
-              <a:ext uri="{FF2B5EF4-FFF2-40B4-BE49-F238E27FC236}">
-                <a16:creationId xmlns:a16="http://schemas.microsoft.com/office/drawing/2014/main" id="{36556B6A-97A7-CADF-3561-4A12ED7B804F}"/>
-              </a:ext>
-            </a:extLst>
-          </p:cNvPr>
-          <p:cNvPicPr>
-            <a:picLocks noChangeAspect="1"/>
-          </p:cNvPicPr>
-          <p:nvPr/>
-        </p:nvPicPr>
-        <p:blipFill>
-          <a:blip r:embed="rId8">
-            <a:extLst>
-              <a:ext uri="{28A0092B-C50C-407E-A947-70E740481C1C}">
-                <a14:useLocalDpi xmlns:a14="http://schemas.microsoft.com/office/drawing/2010/main" val="0"/>
-              </a:ext>
-            </a:extLst>
-          </a:blip>
-          <a:stretch>
-            <a:fillRect/>
-          </a:stretch>
-        </p:blipFill>
-        <p:spPr>
-          <a:xfrm>
-            <a:off x="9056848" y="3398460"/>
-            <a:ext cx="395252" cy="395252"/>
-          </a:xfrm>
-          <a:prstGeom prst="rect">
-            <a:avLst/>
-          </a:prstGeom>
-        </p:spPr>
-      </p:pic>
-      <p:pic>
-        <p:nvPicPr>
-          <p:cNvPr id="47" name="Picture 46" descr="Shape&#10;&#10;Description automatically generated with low confidence">
-            <a:extLst>
-              <a:ext uri="{FF2B5EF4-FFF2-40B4-BE49-F238E27FC236}">
-                <a16:creationId xmlns:a16="http://schemas.microsoft.com/office/drawing/2014/main" id="{2E946DF4-4383-77FB-0367-C834971B24EB}"/>
-              </a:ext>
-            </a:extLst>
-          </p:cNvPr>
-          <p:cNvPicPr>
-            <a:picLocks noChangeAspect="1"/>
-          </p:cNvPicPr>
-          <p:nvPr/>
-        </p:nvPicPr>
-        <p:blipFill>
-          <a:blip r:embed="rId8">
-            <a:extLst>
-              <a:ext uri="{28A0092B-C50C-407E-A947-70E740481C1C}">
-                <a14:useLocalDpi xmlns:a14="http://schemas.microsoft.com/office/drawing/2010/main" val="0"/>
-              </a:ext>
-            </a:extLst>
-          </a:blip>
-          <a:stretch>
-            <a:fillRect/>
-          </a:stretch>
-        </p:blipFill>
-        <p:spPr>
-          <a:xfrm>
-            <a:off x="9056848" y="3907172"/>
-            <a:ext cx="395252" cy="395252"/>
-          </a:xfrm>
-          <a:prstGeom prst="rect">
-            <a:avLst/>
-          </a:prstGeom>
-        </p:spPr>
-      </p:pic>
-      <p:pic>
-        <p:nvPicPr>
-          <p:cNvPr id="49" name="Picture 48" descr="Shape&#10;&#10;Description automatically generated with low confidence">
-            <a:extLst>
-              <a:ext uri="{FF2B5EF4-FFF2-40B4-BE49-F238E27FC236}">
-                <a16:creationId xmlns:a16="http://schemas.microsoft.com/office/drawing/2014/main" id="{661C13C7-4AEA-6159-FA32-626C793770F4}"/>
-              </a:ext>
-            </a:extLst>
-          </p:cNvPr>
-          <p:cNvPicPr>
-            <a:picLocks noChangeAspect="1"/>
-          </p:cNvPicPr>
-          <p:nvPr/>
-        </p:nvPicPr>
-        <p:blipFill>
-          <a:blip r:embed="rId9">
-            <a:extLst>
-              <a:ext uri="{28A0092B-C50C-407E-A947-70E740481C1C}">
-                <a14:useLocalDpi xmlns:a14="http://schemas.microsoft.com/office/drawing/2010/main" val="0"/>
-              </a:ext>
-            </a:extLst>
-          </a:blip>
-          <a:stretch>
-            <a:fillRect/>
-          </a:stretch>
-        </p:blipFill>
-        <p:spPr>
-          <a:xfrm>
-            <a:off x="9520440" y="2866663"/>
-            <a:ext cx="395252" cy="395252"/>
-          </a:xfrm>
-          <a:prstGeom prst="rect">
-            <a:avLst/>
-          </a:prstGeom>
-        </p:spPr>
-      </p:pic>
-      <p:pic>
-        <p:nvPicPr>
-          <p:cNvPr id="50" name="Picture 49" descr="Shape&#10;&#10;Description automatically generated with low confidence">
-            <a:extLst>
-              <a:ext uri="{FF2B5EF4-FFF2-40B4-BE49-F238E27FC236}">
-                <a16:creationId xmlns:a16="http://schemas.microsoft.com/office/drawing/2014/main" id="{22B81532-8E97-B92F-729C-AEA05083B0F7}"/>
-              </a:ext>
-            </a:extLst>
-          </p:cNvPr>
-          <p:cNvPicPr>
-            <a:picLocks noChangeAspect="1"/>
-          </p:cNvPicPr>
-          <p:nvPr/>
-        </p:nvPicPr>
-        <p:blipFill>
-          <a:blip r:embed="rId9">
-            <a:extLst>
-              <a:ext uri="{28A0092B-C50C-407E-A947-70E740481C1C}">
-                <a14:useLocalDpi xmlns:a14="http://schemas.microsoft.com/office/drawing/2010/main" val="0"/>
-              </a:ext>
-            </a:extLst>
-          </a:blip>
-          <a:stretch>
-            <a:fillRect/>
-          </a:stretch>
-        </p:blipFill>
-        <p:spPr>
-          <a:xfrm>
-            <a:off x="9520440" y="3385207"/>
-            <a:ext cx="395252" cy="395252"/>
-          </a:xfrm>
-          <a:prstGeom prst="rect">
-            <a:avLst/>
-          </a:prstGeom>
-        </p:spPr>
-      </p:pic>
-      <p:pic>
-        <p:nvPicPr>
-          <p:cNvPr id="51" name="Picture 50" descr="Shape&#10;&#10;Description automatically generated with low confidence">
-            <a:extLst>
-              <a:ext uri="{FF2B5EF4-FFF2-40B4-BE49-F238E27FC236}">
-                <a16:creationId xmlns:a16="http://schemas.microsoft.com/office/drawing/2014/main" id="{40412EBF-5A9C-96D8-5F8B-7763F54D22BE}"/>
-              </a:ext>
-            </a:extLst>
-          </p:cNvPr>
-          <p:cNvPicPr>
-            <a:picLocks noChangeAspect="1"/>
-          </p:cNvPicPr>
-          <p:nvPr/>
-        </p:nvPicPr>
-        <p:blipFill>
-          <a:blip r:embed="rId9">
-            <a:extLst>
-              <a:ext uri="{28A0092B-C50C-407E-A947-70E740481C1C}">
-                <a14:useLocalDpi xmlns:a14="http://schemas.microsoft.com/office/drawing/2010/main" val="0"/>
-              </a:ext>
-            </a:extLst>
-          </a:blip>
-          <a:stretch>
-            <a:fillRect/>
-          </a:stretch>
-        </p:blipFill>
-        <p:spPr>
-          <a:xfrm>
-            <a:off x="9562558" y="3879703"/>
-            <a:ext cx="395252" cy="395252"/>
-          </a:xfrm>
-          <a:prstGeom prst="rect">
-            <a:avLst/>
-          </a:prstGeom>
-        </p:spPr>
-      </p:pic>
-      <p:sp>
-        <p:nvSpPr>
-          <p:cNvPr id="52" name="Rectangle 51">
-            <a:extLst>
-              <a:ext uri="{FF2B5EF4-FFF2-40B4-BE49-F238E27FC236}">
-                <a16:creationId xmlns:a16="http://schemas.microsoft.com/office/drawing/2014/main" id="{069C0469-EFC4-826A-30EA-053F48CCE259}"/>
+              <a:t>www.youtube.com/watch?eawsfgw1214123121...</a:t>
+            </a:r>
+            <a:endParaRPr lang="en-IL" dirty="0"/>
+          </a:p>
+        </p:txBody>
+      </p:sp>
+      <p:sp>
+        <p:nvSpPr>
+          <p:cNvPr id="19" name="Rectangle 18">
+            <a:extLst>
+              <a:ext uri="{FF2B5EF4-FFF2-40B4-BE49-F238E27FC236}">
+                <a16:creationId xmlns:a16="http://schemas.microsoft.com/office/drawing/2014/main" id="{0FD743AF-0AB5-EF7F-9CF5-514B7BD7190D}"/>
               </a:ext>
             </a:extLst>
           </p:cNvPr>
@@ -4862,8 +4459,8 @@
         </p:nvSpPr>
         <p:spPr>
           <a:xfrm>
-            <a:off x="2295727" y="5489637"/>
-            <a:ext cx="6319737" cy="340313"/>
+            <a:off x="601884" y="2894134"/>
+            <a:ext cx="2803044" cy="340313"/>
           </a:xfrm>
           <a:prstGeom prst="rect">
             <a:avLst/>
@@ -4887,71 +4484,36 @@
           <a:bodyPr rtlCol="0" anchor="ctr"/>
           <a:lstStyle/>
           <a:p>
-            <a:pPr algn="ctr"/>
-            <a:endParaRPr lang="en-IL"/>
-          </a:p>
-        </p:txBody>
-      </p:sp>
-      <p:sp>
-        <p:nvSpPr>
-          <p:cNvPr id="53" name="TextBox 52">
-            <a:extLst>
-              <a:ext uri="{FF2B5EF4-FFF2-40B4-BE49-F238E27FC236}">
-                <a16:creationId xmlns:a16="http://schemas.microsoft.com/office/drawing/2014/main" id="{AA632E57-BEC0-D9F7-BFA1-88781C594EBE}"/>
-              </a:ext>
-            </a:extLst>
-          </p:cNvPr>
-          <p:cNvSpPr txBox="1"/>
+            <a:r>
+              <a:rPr lang="en-US" dirty="0">
+                <a:hlinkClick r:id="rId3"/>
+              </a:rPr>
+              <a:t>http://abc.sh/rick</a:t>
+            </a:r>
+            <a:endParaRPr lang="en-IL" dirty="0"/>
+          </a:p>
+        </p:txBody>
+      </p:sp>
+      <p:sp>
+        <p:nvSpPr>
+          <p:cNvPr id="20" name="Rectangle 19">
+            <a:extLst>
+              <a:ext uri="{FF2B5EF4-FFF2-40B4-BE49-F238E27FC236}">
+                <a16:creationId xmlns:a16="http://schemas.microsoft.com/office/drawing/2014/main" id="{44F03E5D-D6D4-95EC-C336-8B612F8548EE}"/>
+              </a:ext>
+            </a:extLst>
+          </p:cNvPr>
+          <p:cNvSpPr/>
           <p:nvPr/>
         </p:nvSpPr>
         <p:spPr>
           <a:xfrm>
-            <a:off x="499352" y="5453963"/>
-            <a:ext cx="1643975" cy="369332"/>
+            <a:off x="601883" y="3385207"/>
+            <a:ext cx="2803044" cy="340313"/>
           </a:xfrm>
           <a:prstGeom prst="rect">
             <a:avLst/>
           </a:prstGeom>
-          <a:noFill/>
-        </p:spPr>
-        <p:txBody>
-          <a:bodyPr wrap="square" rtlCol="0">
-            <a:spAutoFit/>
-          </a:bodyPr>
-          <a:lstStyle/>
-          <a:p>
-            <a:r>
-              <a:rPr lang="en-US" dirty="0"/>
-              <a:t>URL to shorten:</a:t>
-            </a:r>
-          </a:p>
-        </p:txBody>
-      </p:sp>
-      <p:sp>
-        <p:nvSpPr>
-          <p:cNvPr id="55" name="Rectangle 54">
-            <a:extLst>
-              <a:ext uri="{FF2B5EF4-FFF2-40B4-BE49-F238E27FC236}">
-                <a16:creationId xmlns:a16="http://schemas.microsoft.com/office/drawing/2014/main" id="{2B4DB0A4-F7D3-54A8-99FB-EFEAD3BE3EE5}"/>
-              </a:ext>
-            </a:extLst>
-          </p:cNvPr>
-          <p:cNvSpPr/>
-          <p:nvPr/>
-        </p:nvSpPr>
-        <p:spPr>
-          <a:xfrm>
-            <a:off x="2295727" y="6084308"/>
-            <a:ext cx="1520961" cy="340313"/>
-          </a:xfrm>
-          <a:prstGeom prst="rect">
-            <a:avLst/>
-          </a:prstGeom>
-          <a:solidFill>
-            <a:schemeClr val="bg1">
-              <a:lumMod val="85000"/>
-            </a:schemeClr>
-          </a:solidFill>
         </p:spPr>
         <p:style>
           <a:lnRef idx="2">
@@ -4972,8 +4534,14 @@
           <a:lstStyle/>
           <a:p>
             <a:r>
+              <a:rPr lang="en-US" dirty="0">
+                <a:hlinkClick r:id="rId4"/>
+              </a:rPr>
+              <a:t>http://abc.sh/test</a:t>
+            </a:r>
+            <a:r>
               <a:rPr lang="en-US" dirty="0"/>
-              <a:t>http://abc.sh/</a:t>
+              <a:t> </a:t>
             </a:r>
             <a:endParaRPr lang="en-IL" dirty="0"/>
           </a:p>
@@ -4981,10 +4549,10 @@
       </p:sp>
       <p:sp>
         <p:nvSpPr>
-          <p:cNvPr id="56" name="Rectangle 55">
-            <a:extLst>
-              <a:ext uri="{FF2B5EF4-FFF2-40B4-BE49-F238E27FC236}">
-                <a16:creationId xmlns:a16="http://schemas.microsoft.com/office/drawing/2014/main" id="{023AA857-9958-27F4-AD95-8AA8EA727539}"/>
+          <p:cNvPr id="21" name="Rectangle 20">
+            <a:extLst>
+              <a:ext uri="{FF2B5EF4-FFF2-40B4-BE49-F238E27FC236}">
+                <a16:creationId xmlns:a16="http://schemas.microsoft.com/office/drawing/2014/main" id="{1AFBC962-FF90-9EDC-4B30-927B76DEF744}"/>
               </a:ext>
             </a:extLst>
           </p:cNvPr>
@@ -4993,8 +4561,8 @@
         </p:nvSpPr>
         <p:spPr>
           <a:xfrm>
-            <a:off x="3934634" y="6084307"/>
-            <a:ext cx="4680830" cy="340313"/>
+            <a:off x="601883" y="3879703"/>
+            <a:ext cx="2803044" cy="340313"/>
           </a:xfrm>
           <a:prstGeom prst="rect">
             <a:avLst/>
@@ -5018,6 +4586,507 @@
           <a:bodyPr rtlCol="0" anchor="ctr"/>
           <a:lstStyle/>
           <a:p>
+            <a:r>
+              <a:rPr lang="en-US" dirty="0">
+                <a:hlinkClick r:id="rId5"/>
+              </a:rPr>
+              <a:t>http://abc.sh/jojo_part7</a:t>
+            </a:r>
+            <a:r>
+              <a:rPr lang="en-US" dirty="0"/>
+              <a:t> </a:t>
+            </a:r>
+          </a:p>
+        </p:txBody>
+      </p:sp>
+      <p:sp>
+        <p:nvSpPr>
+          <p:cNvPr id="22" name="TextBox 21">
+            <a:extLst>
+              <a:ext uri="{FF2B5EF4-FFF2-40B4-BE49-F238E27FC236}">
+                <a16:creationId xmlns:a16="http://schemas.microsoft.com/office/drawing/2014/main" id="{69BDDB1A-D1A6-BD20-61C4-A778136C59B4}"/>
+              </a:ext>
+            </a:extLst>
+          </p:cNvPr>
+          <p:cNvSpPr txBox="1"/>
+          <p:nvPr/>
+        </p:nvSpPr>
+        <p:spPr>
+          <a:xfrm>
+            <a:off x="3573496" y="433379"/>
+            <a:ext cx="4023806" cy="646331"/>
+          </a:xfrm>
+          <a:prstGeom prst="rect">
+            <a:avLst/>
+          </a:prstGeom>
+          <a:noFill/>
+        </p:spPr>
+        <p:txBody>
+          <a:bodyPr wrap="square" rtlCol="0">
+            <a:spAutoFit/>
+          </a:bodyPr>
+          <a:lstStyle/>
+          <a:p>
+            <a:r>
+              <a:rPr lang="en-US" sz="3600" dirty="0"/>
+              <a:t>ABC URL Shortener</a:t>
+            </a:r>
+            <a:endParaRPr lang="en-IL" sz="3600" dirty="0"/>
+          </a:p>
+        </p:txBody>
+      </p:sp>
+      <p:pic>
+        <p:nvPicPr>
+          <p:cNvPr id="24" name="Picture 23" descr="Shape&#10;&#10;Description automatically generated with low confidence">
+            <a:extLst>
+              <a:ext uri="{FF2B5EF4-FFF2-40B4-BE49-F238E27FC236}">
+                <a16:creationId xmlns:a16="http://schemas.microsoft.com/office/drawing/2014/main" id="{15305663-19BC-13DA-6537-F03577ABAA61}"/>
+              </a:ext>
+            </a:extLst>
+          </p:cNvPr>
+          <p:cNvPicPr>
+            <a:picLocks noChangeAspect="1"/>
+          </p:cNvPicPr>
+          <p:nvPr/>
+        </p:nvPicPr>
+        <p:blipFill>
+          <a:blip r:embed="rId6">
+            <a:extLst>
+              <a:ext uri="{28A0092B-C50C-407E-A947-70E740481C1C}">
+                <a14:useLocalDpi xmlns:a14="http://schemas.microsoft.com/office/drawing/2010/main" val="0"/>
+              </a:ext>
+            </a:extLst>
+          </a:blip>
+          <a:stretch>
+            <a:fillRect/>
+          </a:stretch>
+        </p:blipFill>
+        <p:spPr>
+          <a:xfrm>
+            <a:off x="8648195" y="2894133"/>
+            <a:ext cx="340313" cy="340313"/>
+          </a:xfrm>
+          <a:prstGeom prst="rect">
+            <a:avLst/>
+          </a:prstGeom>
+        </p:spPr>
+      </p:pic>
+      <p:pic>
+        <p:nvPicPr>
+          <p:cNvPr id="25" name="Picture 24" descr="Shape&#10;&#10;Description automatically generated with low confidence">
+            <a:extLst>
+              <a:ext uri="{FF2B5EF4-FFF2-40B4-BE49-F238E27FC236}">
+                <a16:creationId xmlns:a16="http://schemas.microsoft.com/office/drawing/2014/main" id="{308891CD-2DC5-5980-9EDE-6FA722D09552}"/>
+              </a:ext>
+            </a:extLst>
+          </p:cNvPr>
+          <p:cNvPicPr>
+            <a:picLocks noChangeAspect="1"/>
+          </p:cNvPicPr>
+          <p:nvPr/>
+        </p:nvPicPr>
+        <p:blipFill>
+          <a:blip r:embed="rId6">
+            <a:extLst>
+              <a:ext uri="{28A0092B-C50C-407E-A947-70E740481C1C}">
+                <a14:useLocalDpi xmlns:a14="http://schemas.microsoft.com/office/drawing/2010/main" val="0"/>
+              </a:ext>
+            </a:extLst>
+          </a:blip>
+          <a:stretch>
+            <a:fillRect/>
+          </a:stretch>
+        </p:blipFill>
+        <p:spPr>
+          <a:xfrm>
+            <a:off x="8648194" y="3385207"/>
+            <a:ext cx="340313" cy="340313"/>
+          </a:xfrm>
+          <a:prstGeom prst="rect">
+            <a:avLst/>
+          </a:prstGeom>
+        </p:spPr>
+      </p:pic>
+      <p:pic>
+        <p:nvPicPr>
+          <p:cNvPr id="26" name="Picture 25" descr="Shape&#10;&#10;Description automatically generated with low confidence">
+            <a:extLst>
+              <a:ext uri="{FF2B5EF4-FFF2-40B4-BE49-F238E27FC236}">
+                <a16:creationId xmlns:a16="http://schemas.microsoft.com/office/drawing/2014/main" id="{D2489CA5-570C-D8BE-DBE1-0DDCFE9365AB}"/>
+              </a:ext>
+            </a:extLst>
+          </p:cNvPr>
+          <p:cNvPicPr>
+            <a:picLocks noChangeAspect="1"/>
+          </p:cNvPicPr>
+          <p:nvPr/>
+        </p:nvPicPr>
+        <p:blipFill>
+          <a:blip r:embed="rId6">
+            <a:extLst>
+              <a:ext uri="{28A0092B-C50C-407E-A947-70E740481C1C}">
+                <a14:useLocalDpi xmlns:a14="http://schemas.microsoft.com/office/drawing/2010/main" val="0"/>
+              </a:ext>
+            </a:extLst>
+          </a:blip>
+          <a:stretch>
+            <a:fillRect/>
+          </a:stretch>
+        </p:blipFill>
+        <p:spPr>
+          <a:xfrm>
+            <a:off x="8667799" y="3879703"/>
+            <a:ext cx="340313" cy="340313"/>
+          </a:xfrm>
+          <a:prstGeom prst="rect">
+            <a:avLst/>
+          </a:prstGeom>
+        </p:spPr>
+      </p:pic>
+      <p:pic>
+        <p:nvPicPr>
+          <p:cNvPr id="28" name="Picture 27">
+            <a:extLst>
+              <a:ext uri="{FF2B5EF4-FFF2-40B4-BE49-F238E27FC236}">
+                <a16:creationId xmlns:a16="http://schemas.microsoft.com/office/drawing/2014/main" id="{BD242845-0391-ADDE-8F32-D47D55803CFB}"/>
+              </a:ext>
+            </a:extLst>
+          </p:cNvPr>
+          <p:cNvPicPr>
+            <a:picLocks noChangeAspect="1"/>
+          </p:cNvPicPr>
+          <p:nvPr/>
+        </p:nvPicPr>
+        <p:blipFill>
+          <a:blip r:embed="rId7"/>
+          <a:stretch>
+            <a:fillRect/>
+          </a:stretch>
+        </p:blipFill>
+        <p:spPr>
+          <a:xfrm>
+            <a:off x="8750009" y="5400131"/>
+            <a:ext cx="476996" cy="476996"/>
+          </a:xfrm>
+          <a:prstGeom prst="rect">
+            <a:avLst/>
+          </a:prstGeom>
+        </p:spPr>
+      </p:pic>
+      <p:pic>
+        <p:nvPicPr>
+          <p:cNvPr id="47" name="Picture 46" descr="Shape&#10;&#10;Description automatically generated with low confidence">
+            <a:extLst>
+              <a:ext uri="{FF2B5EF4-FFF2-40B4-BE49-F238E27FC236}">
+                <a16:creationId xmlns:a16="http://schemas.microsoft.com/office/drawing/2014/main" id="{2E946DF4-4383-77FB-0367-C834971B24EB}"/>
+              </a:ext>
+            </a:extLst>
+          </p:cNvPr>
+          <p:cNvPicPr>
+            <a:picLocks noChangeAspect="1"/>
+          </p:cNvPicPr>
+          <p:nvPr/>
+        </p:nvPicPr>
+        <p:blipFill>
+          <a:blip r:embed="rId8">
+            <a:extLst>
+              <a:ext uri="{28A0092B-C50C-407E-A947-70E740481C1C}">
+                <a14:useLocalDpi xmlns:a14="http://schemas.microsoft.com/office/drawing/2010/main" val="0"/>
+              </a:ext>
+            </a:extLst>
+          </a:blip>
+          <a:stretch>
+            <a:fillRect/>
+          </a:stretch>
+        </p:blipFill>
+        <p:spPr>
+          <a:xfrm>
+            <a:off x="10023832" y="2869456"/>
+            <a:ext cx="395252" cy="395252"/>
+          </a:xfrm>
+          <a:prstGeom prst="rect">
+            <a:avLst/>
+          </a:prstGeom>
+        </p:spPr>
+      </p:pic>
+      <p:pic>
+        <p:nvPicPr>
+          <p:cNvPr id="49" name="Picture 48" descr="Shape&#10;&#10;Description automatically generated with low confidence">
+            <a:extLst>
+              <a:ext uri="{FF2B5EF4-FFF2-40B4-BE49-F238E27FC236}">
+                <a16:creationId xmlns:a16="http://schemas.microsoft.com/office/drawing/2014/main" id="{661C13C7-4AEA-6159-FA32-626C793770F4}"/>
+              </a:ext>
+            </a:extLst>
+          </p:cNvPr>
+          <p:cNvPicPr>
+            <a:picLocks noChangeAspect="1"/>
+          </p:cNvPicPr>
+          <p:nvPr/>
+        </p:nvPicPr>
+        <p:blipFill>
+          <a:blip r:embed="rId9">
+            <a:extLst>
+              <a:ext uri="{28A0092B-C50C-407E-A947-70E740481C1C}">
+                <a14:useLocalDpi xmlns:a14="http://schemas.microsoft.com/office/drawing/2010/main" val="0"/>
+              </a:ext>
+            </a:extLst>
+          </a:blip>
+          <a:stretch>
+            <a:fillRect/>
+          </a:stretch>
+        </p:blipFill>
+        <p:spPr>
+          <a:xfrm>
+            <a:off x="9170666" y="2811724"/>
+            <a:ext cx="395252" cy="395252"/>
+          </a:xfrm>
+          <a:prstGeom prst="rect">
+            <a:avLst/>
+          </a:prstGeom>
+        </p:spPr>
+      </p:pic>
+      <p:pic>
+        <p:nvPicPr>
+          <p:cNvPr id="50" name="Picture 49" descr="Shape&#10;&#10;Description automatically generated with low confidence">
+            <a:extLst>
+              <a:ext uri="{FF2B5EF4-FFF2-40B4-BE49-F238E27FC236}">
+                <a16:creationId xmlns:a16="http://schemas.microsoft.com/office/drawing/2014/main" id="{22B81532-8E97-B92F-729C-AEA05083B0F7}"/>
+              </a:ext>
+            </a:extLst>
+          </p:cNvPr>
+          <p:cNvPicPr>
+            <a:picLocks noChangeAspect="1"/>
+          </p:cNvPicPr>
+          <p:nvPr/>
+        </p:nvPicPr>
+        <p:blipFill>
+          <a:blip r:embed="rId9">
+            <a:extLst>
+              <a:ext uri="{28A0092B-C50C-407E-A947-70E740481C1C}">
+                <a14:useLocalDpi xmlns:a14="http://schemas.microsoft.com/office/drawing/2010/main" val="0"/>
+              </a:ext>
+            </a:extLst>
+          </a:blip>
+          <a:stretch>
+            <a:fillRect/>
+          </a:stretch>
+        </p:blipFill>
+        <p:spPr>
+          <a:xfrm>
+            <a:off x="9170666" y="3330268"/>
+            <a:ext cx="395252" cy="395252"/>
+          </a:xfrm>
+          <a:prstGeom prst="rect">
+            <a:avLst/>
+          </a:prstGeom>
+        </p:spPr>
+      </p:pic>
+      <p:pic>
+        <p:nvPicPr>
+          <p:cNvPr id="51" name="Picture 50" descr="Shape&#10;&#10;Description automatically generated with low confidence">
+            <a:extLst>
+              <a:ext uri="{FF2B5EF4-FFF2-40B4-BE49-F238E27FC236}">
+                <a16:creationId xmlns:a16="http://schemas.microsoft.com/office/drawing/2014/main" id="{40412EBF-5A9C-96D8-5F8B-7763F54D22BE}"/>
+              </a:ext>
+            </a:extLst>
+          </p:cNvPr>
+          <p:cNvPicPr>
+            <a:picLocks noChangeAspect="1"/>
+          </p:cNvPicPr>
+          <p:nvPr/>
+        </p:nvPicPr>
+        <p:blipFill>
+          <a:blip r:embed="rId9">
+            <a:extLst>
+              <a:ext uri="{28A0092B-C50C-407E-A947-70E740481C1C}">
+                <a14:useLocalDpi xmlns:a14="http://schemas.microsoft.com/office/drawing/2010/main" val="0"/>
+              </a:ext>
+            </a:extLst>
+          </a:blip>
+          <a:stretch>
+            <a:fillRect/>
+          </a:stretch>
+        </p:blipFill>
+        <p:spPr>
+          <a:xfrm>
+            <a:off x="9209876" y="3824764"/>
+            <a:ext cx="395252" cy="395252"/>
+          </a:xfrm>
+          <a:prstGeom prst="rect">
+            <a:avLst/>
+          </a:prstGeom>
+        </p:spPr>
+      </p:pic>
+      <p:sp>
+        <p:nvSpPr>
+          <p:cNvPr id="52" name="Rectangle 51">
+            <a:extLst>
+              <a:ext uri="{FF2B5EF4-FFF2-40B4-BE49-F238E27FC236}">
+                <a16:creationId xmlns:a16="http://schemas.microsoft.com/office/drawing/2014/main" id="{069C0469-EFC4-826A-30EA-053F48CCE259}"/>
+              </a:ext>
+            </a:extLst>
+          </p:cNvPr>
+          <p:cNvSpPr/>
+          <p:nvPr/>
+        </p:nvSpPr>
+        <p:spPr>
+          <a:xfrm>
+            <a:off x="2295727" y="5489637"/>
+            <a:ext cx="6319737" cy="340313"/>
+          </a:xfrm>
+          <a:prstGeom prst="rect">
+            <a:avLst/>
+          </a:prstGeom>
+        </p:spPr>
+        <p:style>
+          <a:lnRef idx="2">
+            <a:schemeClr val="accent6"/>
+          </a:lnRef>
+          <a:fillRef idx="1">
+            <a:schemeClr val="lt1"/>
+          </a:fillRef>
+          <a:effectRef idx="0">
+            <a:schemeClr val="accent6"/>
+          </a:effectRef>
+          <a:fontRef idx="minor">
+            <a:schemeClr val="dk1"/>
+          </a:fontRef>
+        </p:style>
+        <p:txBody>
+          <a:bodyPr rtlCol="0" anchor="ctr"/>
+          <a:lstStyle/>
+          <a:p>
+            <a:pPr algn="ctr"/>
+            <a:endParaRPr lang="en-IL"/>
+          </a:p>
+        </p:txBody>
+      </p:sp>
+      <p:sp>
+        <p:nvSpPr>
+          <p:cNvPr id="53" name="TextBox 52">
+            <a:extLst>
+              <a:ext uri="{FF2B5EF4-FFF2-40B4-BE49-F238E27FC236}">
+                <a16:creationId xmlns:a16="http://schemas.microsoft.com/office/drawing/2014/main" id="{AA632E57-BEC0-D9F7-BFA1-88781C594EBE}"/>
+              </a:ext>
+            </a:extLst>
+          </p:cNvPr>
+          <p:cNvSpPr txBox="1"/>
+          <p:nvPr/>
+        </p:nvSpPr>
+        <p:spPr>
+          <a:xfrm>
+            <a:off x="499352" y="5453963"/>
+            <a:ext cx="1643975" cy="369332"/>
+          </a:xfrm>
+          <a:prstGeom prst="rect">
+            <a:avLst/>
+          </a:prstGeom>
+          <a:noFill/>
+        </p:spPr>
+        <p:txBody>
+          <a:bodyPr wrap="square" rtlCol="0">
+            <a:spAutoFit/>
+          </a:bodyPr>
+          <a:lstStyle/>
+          <a:p>
+            <a:r>
+              <a:rPr lang="en-US" dirty="0"/>
+              <a:t>URL to shorten:</a:t>
+            </a:r>
+          </a:p>
+        </p:txBody>
+      </p:sp>
+      <p:sp>
+        <p:nvSpPr>
+          <p:cNvPr id="55" name="Rectangle 54">
+            <a:extLst>
+              <a:ext uri="{FF2B5EF4-FFF2-40B4-BE49-F238E27FC236}">
+                <a16:creationId xmlns:a16="http://schemas.microsoft.com/office/drawing/2014/main" id="{2B4DB0A4-F7D3-54A8-99FB-EFEAD3BE3EE5}"/>
+              </a:ext>
+            </a:extLst>
+          </p:cNvPr>
+          <p:cNvSpPr/>
+          <p:nvPr/>
+        </p:nvSpPr>
+        <p:spPr>
+          <a:xfrm>
+            <a:off x="2295727" y="6084308"/>
+            <a:ext cx="1520961" cy="340313"/>
+          </a:xfrm>
+          <a:prstGeom prst="rect">
+            <a:avLst/>
+          </a:prstGeom>
+          <a:solidFill>
+            <a:schemeClr val="bg1">
+              <a:lumMod val="85000"/>
+            </a:schemeClr>
+          </a:solidFill>
+        </p:spPr>
+        <p:style>
+          <a:lnRef idx="2">
+            <a:schemeClr val="accent6"/>
+          </a:lnRef>
+          <a:fillRef idx="1">
+            <a:schemeClr val="lt1"/>
+          </a:fillRef>
+          <a:effectRef idx="0">
+            <a:schemeClr val="accent6"/>
+          </a:effectRef>
+          <a:fontRef idx="minor">
+            <a:schemeClr val="dk1"/>
+          </a:fontRef>
+        </p:style>
+        <p:txBody>
+          <a:bodyPr rtlCol="0" anchor="ctr"/>
+          <a:lstStyle/>
+          <a:p>
+            <a:r>
+              <a:rPr lang="en-US" dirty="0"/>
+              <a:t>http://abc.sh/</a:t>
+            </a:r>
+            <a:endParaRPr lang="en-IL" dirty="0"/>
+          </a:p>
+        </p:txBody>
+      </p:sp>
+      <p:sp>
+        <p:nvSpPr>
+          <p:cNvPr id="56" name="Rectangle 55">
+            <a:extLst>
+              <a:ext uri="{FF2B5EF4-FFF2-40B4-BE49-F238E27FC236}">
+                <a16:creationId xmlns:a16="http://schemas.microsoft.com/office/drawing/2014/main" id="{023AA857-9958-27F4-AD95-8AA8EA727539}"/>
+              </a:ext>
+            </a:extLst>
+          </p:cNvPr>
+          <p:cNvSpPr/>
+          <p:nvPr/>
+        </p:nvSpPr>
+        <p:spPr>
+          <a:xfrm>
+            <a:off x="3934634" y="6084307"/>
+            <a:ext cx="4680830" cy="340313"/>
+          </a:xfrm>
+          <a:prstGeom prst="rect">
+            <a:avLst/>
+          </a:prstGeom>
+        </p:spPr>
+        <p:style>
+          <a:lnRef idx="2">
+            <a:schemeClr val="accent6"/>
+          </a:lnRef>
+          <a:fillRef idx="1">
+            <a:schemeClr val="lt1"/>
+          </a:fillRef>
+          <a:effectRef idx="0">
+            <a:schemeClr val="accent6"/>
+          </a:effectRef>
+          <a:fontRef idx="minor">
+            <a:schemeClr val="dk1"/>
+          </a:fontRef>
+        </p:style>
+        <p:txBody>
+          <a:bodyPr rtlCol="0" anchor="ctr"/>
+          <a:lstStyle/>
+          <a:p>
             <a:endParaRPr lang="en-IL" dirty="0"/>
           </a:p>
         </p:txBody>
@@ -5125,6 +5194,294 @@
               <a:rPr lang="en-US" dirty="0"/>
               <a:t>Logged in as Alon</a:t>
             </a:r>
+          </a:p>
+        </p:txBody>
+      </p:sp>
+      <p:pic>
+        <p:nvPicPr>
+          <p:cNvPr id="3" name="Picture 2" descr="Shape&#10;&#10;Description automatically generated with low confidence">
+            <a:extLst>
+              <a:ext uri="{FF2B5EF4-FFF2-40B4-BE49-F238E27FC236}">
+                <a16:creationId xmlns:a16="http://schemas.microsoft.com/office/drawing/2014/main" id="{62246FD5-B4EF-507A-4F01-22B738C84CDB}"/>
+              </a:ext>
+            </a:extLst>
+          </p:cNvPr>
+          <p:cNvPicPr>
+            <a:picLocks noChangeAspect="1"/>
+          </p:cNvPicPr>
+          <p:nvPr/>
+        </p:nvPicPr>
+        <p:blipFill>
+          <a:blip r:embed="rId11">
+            <a:extLst>
+              <a:ext uri="{28A0092B-C50C-407E-A947-70E740481C1C}">
+                <a14:useLocalDpi xmlns:a14="http://schemas.microsoft.com/office/drawing/2010/main" val="0"/>
+              </a:ext>
+            </a:extLst>
+          </a:blip>
+          <a:stretch>
+            <a:fillRect/>
+          </a:stretch>
+        </p:blipFill>
+        <p:spPr>
+          <a:xfrm>
+            <a:off x="3110303" y="2966325"/>
+            <a:ext cx="199078" cy="199078"/>
+          </a:xfrm>
+          <a:prstGeom prst="rect">
+            <a:avLst/>
+          </a:prstGeom>
+        </p:spPr>
+      </p:pic>
+      <p:pic>
+        <p:nvPicPr>
+          <p:cNvPr id="4" name="Picture 3" descr="Shape&#10;&#10;Description automatically generated with low confidence">
+            <a:extLst>
+              <a:ext uri="{FF2B5EF4-FFF2-40B4-BE49-F238E27FC236}">
+                <a16:creationId xmlns:a16="http://schemas.microsoft.com/office/drawing/2014/main" id="{5B161B76-2CD0-E445-1576-E8D14ACFADD9}"/>
+              </a:ext>
+            </a:extLst>
+          </p:cNvPr>
+          <p:cNvPicPr>
+            <a:picLocks noChangeAspect="1"/>
+          </p:cNvPicPr>
+          <p:nvPr/>
+        </p:nvPicPr>
+        <p:blipFill>
+          <a:blip r:embed="rId11">
+            <a:extLst>
+              <a:ext uri="{28A0092B-C50C-407E-A947-70E740481C1C}">
+                <a14:useLocalDpi xmlns:a14="http://schemas.microsoft.com/office/drawing/2010/main" val="0"/>
+              </a:ext>
+            </a:extLst>
+          </a:blip>
+          <a:stretch>
+            <a:fillRect/>
+          </a:stretch>
+        </p:blipFill>
+        <p:spPr>
+          <a:xfrm>
+            <a:off x="3110303" y="3469903"/>
+            <a:ext cx="199078" cy="199078"/>
+          </a:xfrm>
+          <a:prstGeom prst="rect">
+            <a:avLst/>
+          </a:prstGeom>
+        </p:spPr>
+      </p:pic>
+      <p:pic>
+        <p:nvPicPr>
+          <p:cNvPr id="5" name="Picture 4" descr="Shape&#10;&#10;Description automatically generated with low confidence">
+            <a:extLst>
+              <a:ext uri="{FF2B5EF4-FFF2-40B4-BE49-F238E27FC236}">
+                <a16:creationId xmlns:a16="http://schemas.microsoft.com/office/drawing/2014/main" id="{C526EA17-1459-8F38-162A-7109B00A27C0}"/>
+              </a:ext>
+            </a:extLst>
+          </p:cNvPr>
+          <p:cNvPicPr>
+            <a:picLocks noChangeAspect="1"/>
+          </p:cNvPicPr>
+          <p:nvPr/>
+        </p:nvPicPr>
+        <p:blipFill>
+          <a:blip r:embed="rId11">
+            <a:extLst>
+              <a:ext uri="{28A0092B-C50C-407E-A947-70E740481C1C}">
+                <a14:useLocalDpi xmlns:a14="http://schemas.microsoft.com/office/drawing/2010/main" val="0"/>
+              </a:ext>
+            </a:extLst>
+          </a:blip>
+          <a:stretch>
+            <a:fillRect/>
+          </a:stretch>
+        </p:blipFill>
+        <p:spPr>
+          <a:xfrm>
+            <a:off x="3112273" y="3948748"/>
+            <a:ext cx="199078" cy="199078"/>
+          </a:xfrm>
+          <a:prstGeom prst="rect">
+            <a:avLst/>
+          </a:prstGeom>
+        </p:spPr>
+      </p:pic>
+      <p:sp>
+        <p:nvSpPr>
+          <p:cNvPr id="13" name="TextBox 12">
+            <a:extLst>
+              <a:ext uri="{FF2B5EF4-FFF2-40B4-BE49-F238E27FC236}">
+                <a16:creationId xmlns:a16="http://schemas.microsoft.com/office/drawing/2014/main" id="{5D8ED06D-0EE5-0457-F078-CE5B3CF7D17B}"/>
+              </a:ext>
+            </a:extLst>
+          </p:cNvPr>
+          <p:cNvSpPr txBox="1"/>
+          <p:nvPr/>
+        </p:nvSpPr>
+        <p:spPr>
+          <a:xfrm>
+            <a:off x="9605128" y="2905938"/>
+            <a:ext cx="418704" cy="369332"/>
+          </a:xfrm>
+          <a:prstGeom prst="rect">
+            <a:avLst/>
+          </a:prstGeom>
+          <a:noFill/>
+        </p:spPr>
+        <p:txBody>
+          <a:bodyPr wrap="none" rtlCol="0">
+            <a:spAutoFit/>
+          </a:bodyPr>
+          <a:lstStyle/>
+          <a:p>
+            <a:r>
+              <a:rPr lang="en-US" dirty="0"/>
+              <a:t>12</a:t>
+            </a:r>
+            <a:endParaRPr lang="en-IL" dirty="0"/>
+          </a:p>
+        </p:txBody>
+      </p:sp>
+      <p:pic>
+        <p:nvPicPr>
+          <p:cNvPr id="14" name="Picture 13" descr="Shape&#10;&#10;Description automatically generated with low confidence">
+            <a:extLst>
+              <a:ext uri="{FF2B5EF4-FFF2-40B4-BE49-F238E27FC236}">
+                <a16:creationId xmlns:a16="http://schemas.microsoft.com/office/drawing/2014/main" id="{E69D5239-F89A-974A-3265-2377A6148C75}"/>
+              </a:ext>
+            </a:extLst>
+          </p:cNvPr>
+          <p:cNvPicPr>
+            <a:picLocks noChangeAspect="1"/>
+          </p:cNvPicPr>
+          <p:nvPr/>
+        </p:nvPicPr>
+        <p:blipFill>
+          <a:blip r:embed="rId8">
+            <a:extLst>
+              <a:ext uri="{28A0092B-C50C-407E-A947-70E740481C1C}">
+                <a14:useLocalDpi xmlns:a14="http://schemas.microsoft.com/office/drawing/2010/main" val="0"/>
+              </a:ext>
+            </a:extLst>
+          </a:blip>
+          <a:stretch>
+            <a:fillRect/>
+          </a:stretch>
+        </p:blipFill>
+        <p:spPr>
+          <a:xfrm>
+            <a:off x="10021215" y="3385105"/>
+            <a:ext cx="395252" cy="395252"/>
+          </a:xfrm>
+          <a:prstGeom prst="rect">
+            <a:avLst/>
+          </a:prstGeom>
+        </p:spPr>
+      </p:pic>
+      <p:sp>
+        <p:nvSpPr>
+          <p:cNvPr id="15" name="TextBox 14">
+            <a:extLst>
+              <a:ext uri="{FF2B5EF4-FFF2-40B4-BE49-F238E27FC236}">
+                <a16:creationId xmlns:a16="http://schemas.microsoft.com/office/drawing/2014/main" id="{12AE863D-6654-B527-F3F7-A4BCACC92CD6}"/>
+              </a:ext>
+            </a:extLst>
+          </p:cNvPr>
+          <p:cNvSpPr txBox="1"/>
+          <p:nvPr/>
+        </p:nvSpPr>
+        <p:spPr>
+          <a:xfrm>
+            <a:off x="9602511" y="3421587"/>
+            <a:ext cx="418704" cy="369332"/>
+          </a:xfrm>
+          <a:prstGeom prst="rect">
+            <a:avLst/>
+          </a:prstGeom>
+          <a:noFill/>
+        </p:spPr>
+        <p:txBody>
+          <a:bodyPr wrap="none" rtlCol="0">
+            <a:spAutoFit/>
+          </a:bodyPr>
+          <a:lstStyle/>
+          <a:p>
+            <a:r>
+              <a:rPr lang="en-US" dirty="0"/>
+              <a:t>12</a:t>
+            </a:r>
+            <a:endParaRPr lang="en-IL" dirty="0"/>
+          </a:p>
+        </p:txBody>
+      </p:sp>
+      <p:pic>
+        <p:nvPicPr>
+          <p:cNvPr id="18" name="Picture 17" descr="Shape&#10;&#10;Description automatically generated with low confidence">
+            <a:extLst>
+              <a:ext uri="{FF2B5EF4-FFF2-40B4-BE49-F238E27FC236}">
+                <a16:creationId xmlns:a16="http://schemas.microsoft.com/office/drawing/2014/main" id="{7BC2C3B9-87FF-762B-D6E6-85104C774138}"/>
+              </a:ext>
+            </a:extLst>
+          </p:cNvPr>
+          <p:cNvPicPr>
+            <a:picLocks noChangeAspect="1"/>
+          </p:cNvPicPr>
+          <p:nvPr/>
+        </p:nvPicPr>
+        <p:blipFill>
+          <a:blip r:embed="rId8">
+            <a:extLst>
+              <a:ext uri="{28A0092B-C50C-407E-A947-70E740481C1C}">
+                <a14:useLocalDpi xmlns:a14="http://schemas.microsoft.com/office/drawing/2010/main" val="0"/>
+              </a:ext>
+            </a:extLst>
+          </a:blip>
+          <a:stretch>
+            <a:fillRect/>
+          </a:stretch>
+        </p:blipFill>
+        <p:spPr>
+          <a:xfrm>
+            <a:off x="10053322" y="3890163"/>
+            <a:ext cx="395252" cy="395252"/>
+          </a:xfrm>
+          <a:prstGeom prst="rect">
+            <a:avLst/>
+          </a:prstGeom>
+        </p:spPr>
+      </p:pic>
+      <p:sp>
+        <p:nvSpPr>
+          <p:cNvPr id="23" name="TextBox 22">
+            <a:extLst>
+              <a:ext uri="{FF2B5EF4-FFF2-40B4-BE49-F238E27FC236}">
+                <a16:creationId xmlns:a16="http://schemas.microsoft.com/office/drawing/2014/main" id="{16249798-7107-0F86-F6E5-6FC7B46A4F7E}"/>
+              </a:ext>
+            </a:extLst>
+          </p:cNvPr>
+          <p:cNvSpPr txBox="1"/>
+          <p:nvPr/>
+        </p:nvSpPr>
+        <p:spPr>
+          <a:xfrm>
+            <a:off x="9634618" y="3926645"/>
+            <a:ext cx="418704" cy="369332"/>
+          </a:xfrm>
+          <a:prstGeom prst="rect">
+            <a:avLst/>
+          </a:prstGeom>
+          <a:noFill/>
+        </p:spPr>
+        <p:txBody>
+          <a:bodyPr wrap="none" rtlCol="0">
+            <a:spAutoFit/>
+          </a:bodyPr>
+          <a:lstStyle/>
+          <a:p>
+            <a:r>
+              <a:rPr lang="en-US" dirty="0"/>
+              <a:t>12</a:t>
+            </a:r>
+            <a:endParaRPr lang="en-IL" dirty="0"/>
           </a:p>
         </p:txBody>
       </p:sp>

</xml_diff>